<commit_message>
code modified and rename
</commit_message>
<xml_diff>
--- a/資料庫分析.pptx
+++ b/資料庫分析.pptx
@@ -19549,7 +19549,7 @@
           <p:nvPr>
             <p:extLst>
               <p:ext uri="{D42A27DB-BD31-4B8C-83A1-F6EECF244321}">
-                <p14:modId xmlns:p14="http://schemas.microsoft.com/office/powerpoint/2010/main" val="792138776"/>
+                <p14:modId xmlns:p14="http://schemas.microsoft.com/office/powerpoint/2010/main" val="731422086"/>
               </p:ext>
             </p:extLst>
           </p:nvPr>
@@ -20226,7 +20226,7 @@
                         <a:rPr lang="en-US" altLang="zh-TW" dirty="0">
                           <a:latin typeface="+mn-lt"/>
                         </a:rPr>
-                        <a:t>10</a:t>
+                        <a:t>9</a:t>
                       </a:r>
                       <a:endParaRPr lang="zh-TW" altLang="en-US" dirty="0">
                         <a:latin typeface="+mn-lt"/>
@@ -20549,7 +20549,7 @@
                         <a:rPr lang="en-US" altLang="zh-TW" dirty="0">
                           <a:latin typeface="+mn-lt"/>
                         </a:rPr>
-                        <a:t>114</a:t>
+                        <a:t>113</a:t>
                       </a:r>
                       <a:endParaRPr lang="zh-TW" altLang="en-US" dirty="0">
                         <a:latin typeface="+mn-lt"/>
@@ -20568,7 +20568,7 @@
                         <a:rPr lang="en-US" altLang="zh-TW" dirty="0">
                           <a:latin typeface="+mn-lt"/>
                         </a:rPr>
-                        <a:t>63</a:t>
+                        <a:t>59</a:t>
                       </a:r>
                       <a:endParaRPr lang="zh-TW" altLang="en-US" dirty="0">
                         <a:latin typeface="+mn-lt"/>
@@ -20632,7 +20632,7 @@
                         <a:rPr lang="en-US" altLang="zh-TW" dirty="0">
                           <a:latin typeface="+mn-lt"/>
                         </a:rPr>
-                        <a:t>37/58.7%</a:t>
+                        <a:t>36/61%</a:t>
                       </a:r>
                       <a:endParaRPr lang="zh-TW" altLang="en-US" dirty="0">
                         <a:latin typeface="+mn-lt"/>

</xml_diff>